<commit_message>
Added Link to local 1.0.0.jar
</commit_message>
<xml_diff>
--- a/docs/ReleaseV1_0_0.pptx
+++ b/docs/ReleaseV1_0_0.pptx
@@ -121,13 +121,37 @@
 <file path=ppt/revisionInfo.xml><?xml version="1.0" encoding="utf-8"?>
 <p1510:revInfo xmlns:a="http://schemas.openxmlformats.org/drawingml/2006/main" xmlns:r="http://schemas.openxmlformats.org/officeDocument/2006/relationships" xmlns:p1510="http://schemas.microsoft.com/office/powerpoint/2015/10/main">
   <p1510:revLst>
-    <p1510:client id="{17DF6B2A-59CE-4467-81B8-B51C16C9AD10}" v="73" dt="2025-06-11T18:37:56.544"/>
+    <p1510:client id="{6085932C-096F-4A25-95AE-A8E25561503A}" v="2" dt="2025-06-12T19:51:19.932"/>
   </p1510:revLst>
 </p1510:revInfo>
 </file>
 
 <file path=ppt/changesInfos/changesInfo1.xml><?xml version="1.0" encoding="utf-8"?>
 <pc:chgInfo xmlns:a="http://schemas.openxmlformats.org/drawingml/2006/main" xmlns:r="http://schemas.openxmlformats.org/officeDocument/2006/relationships" xmlns:ac="http://schemas.microsoft.com/office/drawing/2013/main/command" xmlns:pc="http://schemas.microsoft.com/office/powerpoint/2013/main/command">
+  <pc:docChgLst>
+    <pc:chgData name="Ljutic Kerim" userId="3399f650-dab7-4c51-bc22-3354e7c5d919" providerId="ADAL" clId="{6085932C-096F-4A25-95AE-A8E25561503A}"/>
+    <pc:docChg chg="custSel modSld">
+      <pc:chgData name="Ljutic Kerim" userId="3399f650-dab7-4c51-bc22-3354e7c5d919" providerId="ADAL" clId="{6085932C-096F-4A25-95AE-A8E25561503A}" dt="2025-06-12T19:51:37.719" v="7" actId="115"/>
+      <pc:docMkLst>
+        <pc:docMk/>
+      </pc:docMkLst>
+      <pc:sldChg chg="modSp mod">
+        <pc:chgData name="Ljutic Kerim" userId="3399f650-dab7-4c51-bc22-3354e7c5d919" providerId="ADAL" clId="{6085932C-096F-4A25-95AE-A8E25561503A}" dt="2025-06-12T19:51:37.719" v="7" actId="115"/>
+        <pc:sldMkLst>
+          <pc:docMk/>
+          <pc:sldMk cId="2876198862" sldId="265"/>
+        </pc:sldMkLst>
+        <pc:spChg chg="mod">
+          <ac:chgData name="Ljutic Kerim" userId="3399f650-dab7-4c51-bc22-3354e7c5d919" providerId="ADAL" clId="{6085932C-096F-4A25-95AE-A8E25561503A}" dt="2025-06-12T19:51:37.719" v="7" actId="115"/>
+          <ac:spMkLst>
+            <pc:docMk/>
+            <pc:sldMk cId="2876198862" sldId="265"/>
+            <ac:spMk id="2" creationId="{E40CA60F-E955-4E4D-2795-D3A05BD20E37}"/>
+          </ac:spMkLst>
+        </pc:spChg>
+      </pc:sldChg>
+    </pc:docChg>
+  </pc:docChgLst>
   <pc:docChgLst>
     <pc:chgData name="Carina Moßbauer" userId="9b8c5ff1bd05b72c" providerId="LiveId" clId="{17DF6B2A-59CE-4467-81B8-B51C16C9AD10}"/>
     <pc:docChg chg="undo redo custSel addSld delSld modSld sldOrd">
@@ -531,7 +555,7 @@
           <a:p>
             <a:fld id="{34874171-C799-433B-A5CB-12CAE198F917}" type="datetimeFigureOut">
               <a:rPr lang="de-AT" smtClean="0"/>
-              <a:t>11.06.2025</a:t>
+              <a:t>12.06.2025</a:t>
             </a:fld>
             <a:endParaRPr lang="de-AT"/>
           </a:p>
@@ -731,7 +755,7 @@
           <a:p>
             <a:fld id="{34874171-C799-433B-A5CB-12CAE198F917}" type="datetimeFigureOut">
               <a:rPr lang="de-AT" smtClean="0"/>
-              <a:t>11.06.2025</a:t>
+              <a:t>12.06.2025</a:t>
             </a:fld>
             <a:endParaRPr lang="de-AT"/>
           </a:p>
@@ -941,7 +965,7 @@
           <a:p>
             <a:fld id="{34874171-C799-433B-A5CB-12CAE198F917}" type="datetimeFigureOut">
               <a:rPr lang="de-AT" smtClean="0"/>
-              <a:t>11.06.2025</a:t>
+              <a:t>12.06.2025</a:t>
             </a:fld>
             <a:endParaRPr lang="de-AT"/>
           </a:p>
@@ -1141,7 +1165,7 @@
           <a:p>
             <a:fld id="{34874171-C799-433B-A5CB-12CAE198F917}" type="datetimeFigureOut">
               <a:rPr lang="de-AT" smtClean="0"/>
-              <a:t>11.06.2025</a:t>
+              <a:t>12.06.2025</a:t>
             </a:fld>
             <a:endParaRPr lang="de-AT"/>
           </a:p>
@@ -1417,7 +1441,7 @@
           <a:p>
             <a:fld id="{34874171-C799-433B-A5CB-12CAE198F917}" type="datetimeFigureOut">
               <a:rPr lang="de-AT" smtClean="0"/>
-              <a:t>11.06.2025</a:t>
+              <a:t>12.06.2025</a:t>
             </a:fld>
             <a:endParaRPr lang="de-AT"/>
           </a:p>
@@ -1685,7 +1709,7 @@
           <a:p>
             <a:fld id="{34874171-C799-433B-A5CB-12CAE198F917}" type="datetimeFigureOut">
               <a:rPr lang="de-AT" smtClean="0"/>
-              <a:t>11.06.2025</a:t>
+              <a:t>12.06.2025</a:t>
             </a:fld>
             <a:endParaRPr lang="de-AT"/>
           </a:p>
@@ -2100,7 +2124,7 @@
           <a:p>
             <a:fld id="{34874171-C799-433B-A5CB-12CAE198F917}" type="datetimeFigureOut">
               <a:rPr lang="de-AT" smtClean="0"/>
-              <a:t>11.06.2025</a:t>
+              <a:t>12.06.2025</a:t>
             </a:fld>
             <a:endParaRPr lang="de-AT"/>
           </a:p>
@@ -2242,7 +2266,7 @@
           <a:p>
             <a:fld id="{34874171-C799-433B-A5CB-12CAE198F917}" type="datetimeFigureOut">
               <a:rPr lang="de-AT" smtClean="0"/>
-              <a:t>11.06.2025</a:t>
+              <a:t>12.06.2025</a:t>
             </a:fld>
             <a:endParaRPr lang="de-AT"/>
           </a:p>
@@ -2355,7 +2379,7 @@
           <a:p>
             <a:fld id="{34874171-C799-433B-A5CB-12CAE198F917}" type="datetimeFigureOut">
               <a:rPr lang="de-AT" smtClean="0"/>
-              <a:t>11.06.2025</a:t>
+              <a:t>12.06.2025</a:t>
             </a:fld>
             <a:endParaRPr lang="de-AT"/>
           </a:p>
@@ -2668,7 +2692,7 @@
           <a:p>
             <a:fld id="{34874171-C799-433B-A5CB-12CAE198F917}" type="datetimeFigureOut">
               <a:rPr lang="de-AT" smtClean="0"/>
-              <a:t>11.06.2025</a:t>
+              <a:t>12.06.2025</a:t>
             </a:fld>
             <a:endParaRPr lang="de-AT"/>
           </a:p>
@@ -2957,7 +2981,7 @@
           <a:p>
             <a:fld id="{34874171-C799-433B-A5CB-12CAE198F917}" type="datetimeFigureOut">
               <a:rPr lang="de-AT" smtClean="0"/>
-              <a:t>11.06.2025</a:t>
+              <a:t>12.06.2025</a:t>
             </a:fld>
             <a:endParaRPr lang="de-AT"/>
           </a:p>
@@ -3200,7 +3224,7 @@
           <a:p>
             <a:fld id="{34874171-C799-433B-A5CB-12CAE198F917}" type="datetimeFigureOut">
               <a:rPr lang="de-AT" smtClean="0"/>
-              <a:t>11.06.2025</a:t>
+              <a:t>12.06.2025</a:t>
             </a:fld>
             <a:endParaRPr lang="de-AT"/>
           </a:p>
@@ -4577,13 +4601,28 @@
           </a:xfrm>
         </p:spPr>
         <p:txBody>
-          <a:bodyPr/>
+          <a:bodyPr>
+            <a:normAutofit/>
+          </a:bodyPr>
           <a:lstStyle/>
           <a:p>
             <a:r>
               <a:rPr lang="de-AT" dirty="0"/>
-              <a:t>Live-Demo</a:t>
-            </a:r>
+              <a:t>Live-Demo </a:t>
+            </a:r>
+            <a:r>
+              <a:rPr lang="de-AT" dirty="0" err="1">
+                <a:hlinkClick r:id="rId2">
+                  <a:extLst>
+                    <a:ext uri="{A12FA001-AC4F-418D-AE19-62706E023703}">
+                      <ahyp:hlinkClr xmlns:ahyp="http://schemas.microsoft.com/office/drawing/2018/hyperlinkcolor" val="tx"/>
+                    </a:ext>
+                  </a:extLst>
+                </a:hlinkClick>
+              </a:rPr>
+              <a:t>Lunchify</a:t>
+            </a:r>
+            <a:endParaRPr lang="de-AT" dirty="0"/>
           </a:p>
         </p:txBody>
       </p:sp>
@@ -4680,39 +4719,6 @@
             <a:extLst>
               <a:ext uri="{FF2B5EF4-FFF2-40B4-BE49-F238E27FC236}">
                 <a16:creationId xmlns:a16="http://schemas.microsoft.com/office/drawing/2014/main" id="{09F9F3AF-82A9-B99E-2E17-7DE55E15E341}"/>
-              </a:ext>
-            </a:extLst>
-          </p:cNvPr>
-          <p:cNvPicPr>
-            <a:picLocks noChangeAspect="1"/>
-          </p:cNvPicPr>
-          <p:nvPr/>
-        </p:nvPicPr>
-        <p:blipFill>
-          <a:blip r:embed="rId2">
-            <a:alphaModFix/>
-          </a:blip>
-          <a:srcRect l="69026" t="727" r="14432" b="20871"/>
-          <a:stretch>
-            <a:fillRect/>
-          </a:stretch>
-        </p:blipFill>
-        <p:spPr>
-          <a:xfrm>
-            <a:off x="0" y="0"/>
-            <a:ext cx="1284724" cy="3449638"/>
-          </a:xfrm>
-          <a:prstGeom prst="rect">
-            <a:avLst/>
-          </a:prstGeom>
-        </p:spPr>
-      </p:pic>
-      <p:pic>
-        <p:nvPicPr>
-          <p:cNvPr id="5" name="Grafik 4">
-            <a:extLst>
-              <a:ext uri="{FF2B5EF4-FFF2-40B4-BE49-F238E27FC236}">
-                <a16:creationId xmlns:a16="http://schemas.microsoft.com/office/drawing/2014/main" id="{6A61E12C-3D9E-8BF4-70B6-70272001C410}"/>
               </a:ext>
             </a:extLst>
           </p:cNvPr>
@@ -4725,30 +4731,27 @@
           <a:blip r:embed="rId3">
             <a:alphaModFix/>
           </a:blip>
-          <a:srcRect l="61985" r="21497"/>
+          <a:srcRect l="69026" t="727" r="14432" b="20871"/>
           <a:stretch>
             <a:fillRect/>
           </a:stretch>
         </p:blipFill>
         <p:spPr>
           <a:xfrm>
-            <a:off x="0" y="3475761"/>
-            <a:ext cx="1284723" cy="3382239"/>
+            <a:off x="0" y="0"/>
+            <a:ext cx="1284724" cy="3449638"/>
           </a:xfrm>
           <a:prstGeom prst="rect">
             <a:avLst/>
           </a:prstGeom>
-          <a:ln w="12700">
-            <a:noFill/>
-          </a:ln>
         </p:spPr>
       </p:pic>
       <p:pic>
         <p:nvPicPr>
-          <p:cNvPr id="6" name="Grafik 5" descr="Ein Bild, das Grafiken, Grafikdesign, Logo, Text enthält.&#10;&#10;KI-generierte Inhalte können fehlerhaft sein.">
-            <a:extLst>
-              <a:ext uri="{FF2B5EF4-FFF2-40B4-BE49-F238E27FC236}">
-                <a16:creationId xmlns:a16="http://schemas.microsoft.com/office/drawing/2014/main" id="{098EEA04-8133-293B-D1FB-5D135C69C328}"/>
+          <p:cNvPr id="5" name="Grafik 4">
+            <a:extLst>
+              <a:ext uri="{FF2B5EF4-FFF2-40B4-BE49-F238E27FC236}">
+                <a16:creationId xmlns:a16="http://schemas.microsoft.com/office/drawing/2014/main" id="{6A61E12C-3D9E-8BF4-70B6-70272001C410}"/>
               </a:ext>
             </a:extLst>
           </p:cNvPr>
@@ -4759,10 +4762,46 @@
         </p:nvPicPr>
         <p:blipFill>
           <a:blip r:embed="rId4">
+            <a:alphaModFix/>
+          </a:blip>
+          <a:srcRect l="61985" r="21497"/>
+          <a:stretch>
+            <a:fillRect/>
+          </a:stretch>
+        </p:blipFill>
+        <p:spPr>
+          <a:xfrm>
+            <a:off x="0" y="3475761"/>
+            <a:ext cx="1284723" cy="3382239"/>
+          </a:xfrm>
+          <a:prstGeom prst="rect">
+            <a:avLst/>
+          </a:prstGeom>
+          <a:ln w="12700">
+            <a:noFill/>
+          </a:ln>
+        </p:spPr>
+      </p:pic>
+      <p:pic>
+        <p:nvPicPr>
+          <p:cNvPr id="6" name="Grafik 5" descr="Ein Bild, das Grafiken, Grafikdesign, Logo, Text enthält.&#10;&#10;KI-generierte Inhalte können fehlerhaft sein.">
+            <a:extLst>
+              <a:ext uri="{FF2B5EF4-FFF2-40B4-BE49-F238E27FC236}">
+                <a16:creationId xmlns:a16="http://schemas.microsoft.com/office/drawing/2014/main" id="{098EEA04-8133-293B-D1FB-5D135C69C328}"/>
+              </a:ext>
+            </a:extLst>
+          </p:cNvPr>
+          <p:cNvPicPr>
+            <a:picLocks noChangeAspect="1"/>
+          </p:cNvPicPr>
+          <p:nvPr/>
+        </p:nvPicPr>
+        <p:blipFill>
+          <a:blip r:embed="rId5">
             <a:extLst>
               <a:ext uri="{BEBA8EAE-BF5A-486C-A8C5-ECC9F3942E4B}">
                 <a14:imgProps xmlns:a14="http://schemas.microsoft.com/office/drawing/2010/main">
-                  <a14:imgLayer r:embed="rId5">
+                  <a14:imgLayer r:embed="rId6">
                     <a14:imgEffect>
                       <a14:backgroundRemoval t="9046" b="89967" l="10000" r="90000">
                         <a14:foregroundMark x1="51111" y1="9046" x2="51111" y2="9046"/>

</xml_diff>